<commit_message>
commit before merge with master
</commit_message>
<xml_diff>
--- a/voorstelling.pptx
+++ b/voorstelling.pptx
@@ -1,27 +1,21 @@
 
 <file path=ppt/presentation.xml><?xml version="1.0" encoding="utf-8"?>
-<p:presentation xmlns:a="http://schemas.openxmlformats.org/drawingml/2006/main" xmlns:r="http://schemas.openxmlformats.org/officeDocument/2006/relationships" xmlns:p="http://schemas.openxmlformats.org/presentationml/2006/main" saveSubsetFonts="1">
+<p:presentation xmlns:a="http://schemas.openxmlformats.org/drawingml/2006/main" xmlns:r="http://schemas.openxmlformats.org/officeDocument/2006/relationships" xmlns:p="http://schemas.openxmlformats.org/presentationml/2006/main" showSpecialPlsOnTitleSld="0" saveSubsetFonts="1">
   <p:sldMasterIdLst>
     <p:sldMasterId id="2147483687" r:id="rId1"/>
     <p:sldMasterId id="2147483710" r:id="rId2"/>
     <p:sldMasterId id="2147483720" r:id="rId3"/>
   </p:sldMasterIdLst>
   <p:notesMasterIdLst>
-    <p:notesMasterId r:id="rId13"/>
+    <p:notesMasterId r:id="rId7"/>
   </p:notesMasterIdLst>
   <p:handoutMasterIdLst>
-    <p:handoutMasterId r:id="rId14"/>
+    <p:handoutMasterId r:id="rId8"/>
   </p:handoutMasterIdLst>
   <p:sldIdLst>
     <p:sldId id="256" r:id="rId4"/>
     <p:sldId id="351" r:id="rId5"/>
     <p:sldId id="352" r:id="rId6"/>
-    <p:sldId id="353" r:id="rId7"/>
-    <p:sldId id="354" r:id="rId8"/>
-    <p:sldId id="355" r:id="rId9"/>
-    <p:sldId id="356" r:id="rId10"/>
-    <p:sldId id="357" r:id="rId11"/>
-    <p:sldId id="358" r:id="rId12"/>
   </p:sldIdLst>
   <p:sldSz cx="9144000" cy="6858000" type="screen4x3"/>
   <p:notesSz cx="6858000" cy="9144000"/>
@@ -242,7 +236,7 @@
                 <a:cs typeface="Arial" pitchFamily="34" charset="0"/>
               </a:rPr>
               <a:pPr/>
-              <a:t>10/11/2016</a:t>
+              <a:t>21/11/2016</a:t>
             </a:fld>
             <a:endParaRPr lang="nl-BE" sz="1000">
               <a:latin typeface="Arial" pitchFamily="34" charset="0"/>
@@ -421,7 +415,7 @@
             <a:fld id="{7AF0A2F9-EF49-41B3-9E69-7CDBDC14786A}" type="datetimeFigureOut">
               <a:rPr lang="nl-BE" smtClean="0"/>
               <a:pPr/>
-              <a:t>10/11/2016</a:t>
+              <a:t>21/11/2016</a:t>
             </a:fld>
             <a:endParaRPr lang="nl-BE"/>
           </a:p>
@@ -1516,10 +1510,9 @@
           <a:bodyPr/>
           <a:lstStyle/>
           <a:p>
-            <a:fld id="{97893F66-F94E-4BF2-992D-6D72A01A0AEF}" type="datetime1">
+            <a:fld id="{2EA146F0-F380-4D67-8359-C74B28D67360}" type="datetime1">
               <a:rPr lang="nl-BE" smtClean="0"/>
-              <a:pPr/>
-              <a:t>10/11/2016</a:t>
+              <a:t>21/11/2016</a:t>
             </a:fld>
             <a:endParaRPr lang="nl-BE" dirty="0"/>
           </a:p>
@@ -2216,10 +2209,9 @@
           <a:bodyPr/>
           <a:lstStyle/>
           <a:p>
-            <a:fld id="{8FE3A2F7-E5AA-45D2-A7DF-16E7C00E8B18}" type="datetime1">
+            <a:fld id="{4D5BFDE4-62CE-4127-AB71-372EAA69963A}" type="datetime1">
               <a:rPr lang="nl-BE" smtClean="0"/>
-              <a:pPr/>
-              <a:t>10/11/2016</a:t>
+              <a:t>21/11/2016</a:t>
             </a:fld>
             <a:endParaRPr lang="nl-BE"/>
           </a:p>
@@ -2659,10 +2651,9 @@
           <a:bodyPr/>
           <a:lstStyle/>
           <a:p>
-            <a:fld id="{F1ED6E27-F97F-421F-BF3C-F96E904F4DAE}" type="datetime1">
+            <a:fld id="{6E3A5C4A-D2DC-4EC0-9458-AA8546DA4F4C}" type="datetime1">
               <a:rPr lang="nl-BE" smtClean="0"/>
-              <a:pPr/>
-              <a:t>10/11/2016</a:t>
+              <a:t>21/11/2016</a:t>
             </a:fld>
             <a:endParaRPr lang="nl-BE"/>
           </a:p>
@@ -2783,10 +2774,9 @@
           <a:bodyPr/>
           <a:lstStyle/>
           <a:p>
-            <a:fld id="{F25FC677-6CEC-4066-B49A-5905A6F1687C}" type="datetime1">
+            <a:fld id="{021F9551-2192-439F-81CA-2A29A69D23E8}" type="datetime1">
               <a:rPr lang="nl-BE" smtClean="0"/>
-              <a:pPr/>
-              <a:t>10/11/2016</a:t>
+              <a:t>21/11/2016</a:t>
             </a:fld>
             <a:endParaRPr lang="nl-BE"/>
           </a:p>
@@ -2880,10 +2870,9 @@
           <a:bodyPr/>
           <a:lstStyle/>
           <a:p>
-            <a:fld id="{D5599319-C21F-44FE-B40D-0B7D3C77979B}" type="datetime1">
+            <a:fld id="{4B062AA2-421D-403D-B37E-2C45CFD2B89D}" type="datetime1">
               <a:rPr lang="nl-BE" smtClean="0"/>
-              <a:pPr/>
-              <a:t>10/11/2016</a:t>
+              <a:t>21/11/2016</a:t>
             </a:fld>
             <a:endParaRPr lang="nl-BE"/>
           </a:p>
@@ -3166,10 +3155,9 @@
           <a:bodyPr/>
           <a:lstStyle/>
           <a:p>
-            <a:fld id="{810BDD49-C7B6-43B9-82D0-80BFFEA85E90}" type="datetime1">
+            <a:fld id="{E5D0B953-0E10-4231-8D05-2A0BF6F18768}" type="datetime1">
               <a:rPr lang="nl-BE" smtClean="0"/>
-              <a:pPr/>
-              <a:t>10/11/2016</a:t>
+              <a:t>21/11/2016</a:t>
             </a:fld>
             <a:endParaRPr lang="nl-BE"/>
           </a:p>
@@ -3432,10 +3420,9 @@
           <a:bodyPr/>
           <a:lstStyle/>
           <a:p>
-            <a:fld id="{5679A460-DE61-4F93-B31F-1C672A6E649A}" type="datetime1">
+            <a:fld id="{BE091487-8763-4ED2-899D-C24C207F394E}" type="datetime1">
               <a:rPr lang="nl-BE" smtClean="0"/>
-              <a:pPr/>
-              <a:t>10/11/2016</a:t>
+              <a:t>21/11/2016</a:t>
             </a:fld>
             <a:endParaRPr lang="nl-BE" dirty="0"/>
           </a:p>
@@ -3913,10 +3900,9 @@
           <a:bodyPr/>
           <a:lstStyle/>
           <a:p>
-            <a:fld id="{A8441E81-17DA-43A3-9144-6A856690AFDF}" type="datetime1">
+            <a:fld id="{C2E80579-04C6-44C1-811B-CD2EA2B1CEF0}" type="datetime1">
               <a:rPr lang="nl-BE" smtClean="0"/>
-              <a:pPr/>
-              <a:t>10/11/2016</a:t>
+              <a:t>21/11/2016</a:t>
             </a:fld>
             <a:endParaRPr lang="nl-BE" dirty="0"/>
           </a:p>
@@ -4103,10 +4089,9 @@
           <a:bodyPr/>
           <a:lstStyle/>
           <a:p>
-            <a:fld id="{7D85C6C0-CA4C-4D3B-87F3-C1F8C5CD3EEC}" type="datetime1">
+            <a:fld id="{F93B882C-696F-4586-BD2D-CA82DD39F802}" type="datetime1">
               <a:rPr lang="nl-BE" smtClean="0"/>
-              <a:pPr/>
-              <a:t>10/11/2016</a:t>
+              <a:t>21/11/2016</a:t>
             </a:fld>
             <a:endParaRPr lang="nl-BE" dirty="0"/>
           </a:p>
@@ -4803,10 +4788,9 @@
           <a:bodyPr/>
           <a:lstStyle/>
           <a:p>
-            <a:fld id="{A8B13226-4FD3-43A8-9B61-ADF87E5FE10A}" type="datetime1">
+            <a:fld id="{093A9898-8FF0-4A82-A788-9A40F2A832AD}" type="datetime1">
               <a:rPr lang="nl-BE" smtClean="0"/>
-              <a:pPr/>
-              <a:t>10/11/2016</a:t>
+              <a:t>21/11/2016</a:t>
             </a:fld>
             <a:endParaRPr lang="nl-BE"/>
           </a:p>
@@ -5246,10 +5230,9 @@
           <a:bodyPr/>
           <a:lstStyle/>
           <a:p>
-            <a:fld id="{4CD8585C-8C14-4561-AB5B-AE46DAE547F3}" type="datetime1">
+            <a:fld id="{F7B5EE51-3C03-49D4-B7F0-C86AFC975EBA}" type="datetime1">
               <a:rPr lang="nl-BE" smtClean="0"/>
-              <a:pPr/>
-              <a:t>10/11/2016</a:t>
+              <a:t>21/11/2016</a:t>
             </a:fld>
             <a:endParaRPr lang="nl-BE"/>
           </a:p>
@@ -5370,10 +5353,9 @@
           <a:bodyPr/>
           <a:lstStyle/>
           <a:p>
-            <a:fld id="{1178FC40-74A2-43A4-9ABF-5062576C0E3E}" type="datetime1">
+            <a:fld id="{3278E58A-B12E-4846-B256-143A8C8A9415}" type="datetime1">
               <a:rPr lang="nl-BE" smtClean="0"/>
-              <a:pPr/>
-              <a:t>10/11/2016</a:t>
+              <a:t>21/11/2016</a:t>
             </a:fld>
             <a:endParaRPr lang="nl-BE"/>
           </a:p>
@@ -5467,10 +5449,9 @@
           <a:bodyPr/>
           <a:lstStyle/>
           <a:p>
-            <a:fld id="{6D51E802-99BC-4FE2-8279-EA960743A602}" type="datetime1">
+            <a:fld id="{3C86E109-ED60-4C11-A100-139A7C64F2D4}" type="datetime1">
               <a:rPr lang="nl-BE" smtClean="0"/>
-              <a:pPr/>
-              <a:t>10/11/2016</a:t>
+              <a:t>21/11/2016</a:t>
             </a:fld>
             <a:endParaRPr lang="nl-BE"/>
           </a:p>
@@ -5753,10 +5734,9 @@
           <a:bodyPr/>
           <a:lstStyle/>
           <a:p>
-            <a:fld id="{0032664E-A5CC-40D3-AFC4-173B73C82841}" type="datetime1">
+            <a:fld id="{30D15B12-C27A-45CC-982C-18333B006D8A}" type="datetime1">
               <a:rPr lang="nl-BE" smtClean="0"/>
-              <a:pPr/>
-              <a:t>10/11/2016</a:t>
+              <a:t>21/11/2016</a:t>
             </a:fld>
             <a:endParaRPr lang="nl-BE"/>
           </a:p>
@@ -6063,10 +6043,9 @@
           <a:bodyPr/>
           <a:lstStyle/>
           <a:p>
-            <a:fld id="{FD9389C5-723A-4053-AC2D-9B1CB0A4B394}" type="datetime1">
+            <a:fld id="{2ED5031F-0C7D-4362-A977-86B189D207DB}" type="datetime1">
               <a:rPr lang="nl-BE" smtClean="0"/>
-              <a:pPr/>
-              <a:t>10/11/2016</a:t>
+              <a:t>21/11/2016</a:t>
             </a:fld>
             <a:endParaRPr lang="nl-BE" dirty="0"/>
           </a:p>
@@ -6596,10 +6575,9 @@
           <a:bodyPr/>
           <a:lstStyle/>
           <a:p>
-            <a:fld id="{3A5E4D43-05ED-46F7-8E1C-000CF297F6F7}" type="datetime1">
+            <a:fld id="{6BA98AA5-4E17-422A-87E0-EFD96E4585B3}" type="datetime1">
               <a:rPr lang="nl-BE" smtClean="0"/>
-              <a:pPr/>
-              <a:t>10/11/2016</a:t>
+              <a:t>21/11/2016</a:t>
             </a:fld>
             <a:endParaRPr lang="nl-BE"/>
           </a:p>
@@ -7039,10 +7017,9 @@
           <a:bodyPr/>
           <a:lstStyle/>
           <a:p>
-            <a:fld id="{CBEE107D-C21A-404B-BE18-FE965EAB5EFE}" type="datetime1">
+            <a:fld id="{359A32EB-69CA-489B-8542-ACF9DAF35BD0}" type="datetime1">
               <a:rPr lang="nl-BE" smtClean="0"/>
-              <a:pPr/>
-              <a:t>10/11/2016</a:t>
+              <a:t>21/11/2016</a:t>
             </a:fld>
             <a:endParaRPr lang="nl-BE"/>
           </a:p>
@@ -7163,10 +7140,9 @@
           <a:bodyPr/>
           <a:lstStyle/>
           <a:p>
-            <a:fld id="{1B27F709-D155-44A7-8D3A-A214E7D12BF6}" type="datetime1">
+            <a:fld id="{5C429720-8287-46E5-BDD9-A695F82F5AA6}" type="datetime1">
               <a:rPr lang="nl-BE" smtClean="0"/>
-              <a:pPr/>
-              <a:t>10/11/2016</a:t>
+              <a:t>21/11/2016</a:t>
             </a:fld>
             <a:endParaRPr lang="nl-BE"/>
           </a:p>
@@ -7260,10 +7236,9 @@
           <a:bodyPr/>
           <a:lstStyle/>
           <a:p>
-            <a:fld id="{50A2B68F-2E04-46BB-848D-B9F50EFADB02}" type="datetime1">
+            <a:fld id="{E1118CE8-09FC-4786-9FCC-B5A00B625D06}" type="datetime1">
               <a:rPr lang="nl-BE" smtClean="0"/>
-              <a:pPr/>
-              <a:t>10/11/2016</a:t>
+              <a:t>21/11/2016</a:t>
             </a:fld>
             <a:endParaRPr lang="nl-BE"/>
           </a:p>
@@ -7546,10 +7521,9 @@
           <a:bodyPr/>
           <a:lstStyle/>
           <a:p>
-            <a:fld id="{62FA12A0-03A4-4BB2-9504-57160D603C47}" type="datetime1">
+            <a:fld id="{08281EB5-2E1D-45A5-BC31-5E813FE251D4}" type="datetime1">
               <a:rPr lang="nl-BE" smtClean="0"/>
-              <a:pPr/>
-              <a:t>10/11/2016</a:t>
+              <a:t>21/11/2016</a:t>
             </a:fld>
             <a:endParaRPr lang="nl-BE"/>
           </a:p>
@@ -7812,10 +7786,9 @@
           <a:bodyPr/>
           <a:lstStyle/>
           <a:p>
-            <a:fld id="{95368D69-E905-4A5C-A0AF-F7BBE7B04C66}" type="datetime1">
+            <a:fld id="{7DE00635-1B86-4382-8647-DE3D2FA947F5}" type="datetime1">
               <a:rPr lang="nl-BE" smtClean="0"/>
-              <a:pPr/>
-              <a:t>10/11/2016</a:t>
+              <a:t>21/11/2016</a:t>
             </a:fld>
             <a:endParaRPr lang="nl-BE" dirty="0"/>
           </a:p>
@@ -8084,10 +8057,9 @@
             </a:lvl1pPr>
           </a:lstStyle>
           <a:p>
-            <a:fld id="{CE7F2DF4-49C5-462C-AC7A-9CA471293C63}" type="datetime1">
+            <a:fld id="{FFF6D5CE-1BDF-4E21-9A40-16315179F713}" type="datetime1">
               <a:rPr lang="nl-BE" smtClean="0"/>
-              <a:pPr/>
-              <a:t>10/11/2016</a:t>
+              <a:t>21/11/2016</a:t>
             </a:fld>
             <a:endParaRPr lang="nl-BE" dirty="0"/>
           </a:p>
@@ -8628,10 +8600,9 @@
             </a:lvl1pPr>
           </a:lstStyle>
           <a:p>
-            <a:fld id="{061A4581-8ADD-4D13-A822-C54D4EF69866}" type="datetime1">
+            <a:fld id="{014B2E58-7FA8-4DE2-A511-3A25495D7B7F}" type="datetime1">
               <a:rPr lang="nl-BE" smtClean="0"/>
-              <a:pPr/>
-              <a:t>10/11/2016</a:t>
+              <a:t>21/11/2016</a:t>
             </a:fld>
             <a:endParaRPr lang="nl-BE" dirty="0"/>
           </a:p>
@@ -9285,10 +9256,9 @@
             </a:lvl1pPr>
           </a:lstStyle>
           <a:p>
-            <a:fld id="{4EB872C1-7556-440C-9D67-BD96415486BD}" type="datetime1">
+            <a:fld id="{87274E1C-37DC-4DA1-825E-4DC046397266}" type="datetime1">
               <a:rPr lang="nl-BE" smtClean="0"/>
-              <a:pPr/>
-              <a:t>10/11/2016</a:t>
+              <a:t>21/11/2016</a:t>
             </a:fld>
             <a:endParaRPr lang="nl-BE" dirty="0"/>
           </a:p>
@@ -9800,27 +9770,25 @@
           <a:lstStyle/>
           <a:p>
             <a:r>
-              <a:rPr lang="nl-BE" dirty="0"/>
-              <a:t>Gamble site</a:t>
-            </a:r>
-          </a:p>
-          <a:p>
-            <a:endParaRPr lang="nl-BE" dirty="0"/>
-          </a:p>
-          <a:p>
-            <a:r>
-              <a:rPr lang="nl-BE" dirty="0" err="1"/>
-              <a:t>Webtechnologie</a:t>
-            </a:r>
-            <a:r>
-              <a:rPr lang="nl-BE" dirty="0"/>
-              <a:t> en webprogrammering</a:t>
-            </a:r>
-          </a:p>
-          <a:p>
-            <a:r>
-              <a:rPr lang="nl-BE" dirty="0"/>
-              <a:t> </a:t>
+              <a:rPr lang="en-GB" dirty="0"/>
+              <a:t>Dynamic Resource </a:t>
+            </a:r>
+            <a:r>
+              <a:rPr lang="en-GB" dirty="0" err="1"/>
+              <a:t>Mangement</a:t>
+            </a:r>
+            <a:r>
+              <a:rPr lang="en-GB" dirty="0"/>
+              <a:t> and Cyber Foraging</a:t>
+            </a:r>
+          </a:p>
+          <a:p>
+            <a:endParaRPr lang="en-GB" dirty="0"/>
+          </a:p>
+          <a:p>
+            <a:r>
+              <a:rPr lang="en-GB" dirty="0"/>
+              <a:t>Distributed embedded software engineering </a:t>
             </a:r>
           </a:p>
         </p:txBody>
@@ -9833,8 +9801,8 @@
         </p:nvSpPr>
         <p:spPr>
           <a:xfrm>
-            <a:off x="179512" y="5373216"/>
-            <a:ext cx="2448272" cy="646331"/>
+            <a:off x="10235" y="6237312"/>
+            <a:ext cx="2448272" cy="369332"/>
           </a:xfrm>
           <a:prstGeom prst="rect">
             <a:avLst/>
@@ -9848,14 +9816,8 @@
           <a:lstStyle/>
           <a:p>
             <a:r>
-              <a:rPr lang="nl-BE" dirty="0"/>
-              <a:t>Kjell Deboysere </a:t>
-            </a:r>
-          </a:p>
-          <a:p>
-            <a:r>
-              <a:rPr lang="nl-BE" dirty="0"/>
-              <a:t>Gilles Vancanneyt</a:t>
+              <a:rPr lang="en-GB" dirty="0"/>
+              <a:t>Kjell Deboysere</a:t>
             </a:r>
           </a:p>
         </p:txBody>
@@ -9906,9 +9868,10 @@
           <a:lstStyle/>
           <a:p>
             <a:r>
-              <a:rPr lang="nl-BE" dirty="0"/>
-              <a:t>Inleiding </a:t>
-            </a:r>
+              <a:rPr lang="en-GB" dirty="0"/>
+              <a:t>Content</a:t>
+            </a:r>
+            <a:endParaRPr lang="nl-BE" dirty="0"/>
           </a:p>
         </p:txBody>
       </p:sp>
@@ -9927,20 +9890,84 @@
           <a:bodyPr/>
           <a:lstStyle/>
           <a:p>
-            <a:r>
-              <a:rPr lang="nl-BE" dirty="0" err="1"/>
-              <a:t>Use</a:t>
-            </a:r>
-            <a:r>
-              <a:rPr lang="nl-BE" dirty="0"/>
-              <a:t> cases</a:t>
-            </a:r>
-          </a:p>
-          <a:p>
-            <a:r>
-              <a:rPr lang="nl-BE" dirty="0"/>
-              <a:t>Demo</a:t>
-            </a:r>
+            <a:pPr marL="457200" indent="-457200">
+              <a:buFont typeface="+mj-lt"/>
+              <a:buAutoNum type="arabicPeriod"/>
+            </a:pPr>
+            <a:r>
+              <a:rPr lang="en-GB" dirty="0"/>
+              <a:t>What is DRM?</a:t>
+            </a:r>
+          </a:p>
+          <a:p>
+            <a:pPr marL="457200" indent="-457200">
+              <a:buFont typeface="+mj-lt"/>
+              <a:buAutoNum type="arabicPeriod"/>
+            </a:pPr>
+            <a:r>
+              <a:rPr lang="en-GB" dirty="0"/>
+              <a:t>Where do I use them?</a:t>
+            </a:r>
+          </a:p>
+          <a:p>
+            <a:pPr marL="457200" indent="-457200">
+              <a:buFont typeface="+mj-lt"/>
+              <a:buAutoNum type="arabicPeriod"/>
+            </a:pPr>
+            <a:r>
+              <a:rPr lang="en-GB" dirty="0"/>
+              <a:t>The Cyber Foraging Process</a:t>
+            </a:r>
+          </a:p>
+          <a:p>
+            <a:pPr marL="457200" indent="-457200">
+              <a:buFont typeface="+mj-lt"/>
+              <a:buAutoNum type="arabicPeriod"/>
+            </a:pPr>
+            <a:r>
+              <a:rPr lang="en-GB" dirty="0"/>
+              <a:t>Different approaches</a:t>
+            </a:r>
+          </a:p>
+          <a:p>
+            <a:pPr marL="457200" indent="-457200">
+              <a:buFont typeface="+mj-lt"/>
+              <a:buAutoNum type="arabicPeriod"/>
+            </a:pPr>
+            <a:r>
+              <a:rPr lang="en-GB" dirty="0"/>
+              <a:t>Summary</a:t>
+            </a:r>
+          </a:p>
+          <a:p>
+            <a:pPr marL="0" indent="0">
+              <a:buNone/>
+            </a:pPr>
+            <a:endParaRPr lang="en-GB" dirty="0"/>
+          </a:p>
+        </p:txBody>
+      </p:sp>
+      <p:sp>
+        <p:nvSpPr>
+          <p:cNvPr id="4" name="Tijdelijke aanduiding voor dianummer 3"/>
+          <p:cNvSpPr>
+            <a:spLocks noGrp="1"/>
+          </p:cNvSpPr>
+          <p:nvPr>
+            <p:ph type="sldNum" sz="quarter" idx="12"/>
+          </p:nvPr>
+        </p:nvSpPr>
+        <p:spPr/>
+        <p:txBody>
+          <a:bodyPr/>
+          <a:lstStyle/>
+          <a:p>
+            <a:fld id="{F35D8031-C8E5-48F8-A3B6-81643B27A3AF}" type="slidenum">
+              <a:rPr lang="nl-BE" smtClean="0"/>
+              <a:pPr/>
+              <a:t>2</a:t>
+            </a:fld>
+            <a:endParaRPr lang="nl-BE" dirty="0"/>
           </a:p>
         </p:txBody>
       </p:sp>
@@ -9990,12 +10017,8 @@
           <a:lstStyle/>
           <a:p>
             <a:r>
-              <a:rPr lang="nl-BE" dirty="0" err="1"/>
-              <a:t>Use</a:t>
-            </a:r>
-            <a:r>
-              <a:rPr lang="nl-BE" dirty="0"/>
-              <a:t> cases</a:t>
+              <a:rPr lang="en-GB" dirty="0"/>
+              <a:t>What is DRM?</a:t>
             </a:r>
           </a:p>
         </p:txBody>
@@ -10041,718 +10064,26 @@
           <a:p>
             <a:r>
               <a:rPr lang="en-GB" dirty="0"/>
-              <a:t>When the server is running and </a:t>
-            </a:r>
-            <a:r>
-              <a:rPr lang="en-GB" dirty="0" err="1"/>
-              <a:t>smn</a:t>
-            </a:r>
+              <a:t>Mobile devices becomes fully fledged personal computing device!</a:t>
+            </a:r>
+          </a:p>
+          <a:p>
             <a:r>
               <a:rPr lang="en-GB" dirty="0"/>
-              <a:t> goes to localhost:2000 then you get a form where the age of the visitor is checked.</a:t>
-            </a:r>
-          </a:p>
-          <a:p>
-            <a:endParaRPr lang="en-GB" dirty="0"/>
-          </a:p>
-          <a:p>
-            <a:r>
-              <a:rPr lang="en-GB" dirty="0"/>
-              <a:t>When you’re to young you will not be allowed on the site.</a:t>
-            </a:r>
-          </a:p>
-          <a:p>
-            <a:r>
-              <a:rPr lang="en-GB" dirty="0"/>
-              <a:t>When you’re old enough you’ll go to the home page.</a:t>
-            </a:r>
+              <a:t>BUT: computing power and battery capacity </a:t>
+            </a:r>
+            <a:r>
+              <a:rPr lang="en-GB"/>
+              <a:t>are limited</a:t>
+            </a:r>
+            <a:endParaRPr lang="en-GB"/>
           </a:p>
         </p:txBody>
       </p:sp>
     </p:spTree>
     <p:extLst>
       <p:ext uri="{BB962C8B-B14F-4D97-AF65-F5344CB8AC3E}">
-        <p14:creationId xmlns:p14="http://schemas.microsoft.com/office/powerpoint/2010/main" val="1556588107"/>
-      </p:ext>
-    </p:extLst>
-  </p:cSld>
-  <p:clrMapOvr>
-    <a:masterClrMapping/>
-  </p:clrMapOvr>
-</p:sld>
-</file>
-
-<file path=ppt/slides/slide4.xml><?xml version="1.0" encoding="utf-8"?>
-<p:sld xmlns:a="http://schemas.openxmlformats.org/drawingml/2006/main" xmlns:r="http://schemas.openxmlformats.org/officeDocument/2006/relationships" xmlns:p="http://schemas.openxmlformats.org/presentationml/2006/main">
-  <p:cSld>
-    <p:spTree>
-      <p:nvGrpSpPr>
-        <p:cNvPr id="1" name=""/>
-        <p:cNvGrpSpPr/>
-        <p:nvPr/>
-      </p:nvGrpSpPr>
-      <p:grpSpPr>
-        <a:xfrm>
-          <a:off x="0" y="0"/>
-          <a:ext cx="0" cy="0"/>
-          <a:chOff x="0" y="0"/>
-          <a:chExt cx="0" cy="0"/>
-        </a:xfrm>
-      </p:grpSpPr>
-      <p:sp>
-        <p:nvSpPr>
-          <p:cNvPr id="2" name="Titel 1"/>
-          <p:cNvSpPr>
-            <a:spLocks noGrp="1"/>
-          </p:cNvSpPr>
-          <p:nvPr>
-            <p:ph type="title"/>
-          </p:nvPr>
-        </p:nvSpPr>
-        <p:spPr/>
-        <p:txBody>
-          <a:bodyPr/>
-          <a:lstStyle/>
-          <a:p>
-            <a:r>
-              <a:rPr lang="nl-BE" dirty="0" err="1"/>
-              <a:t>Use</a:t>
-            </a:r>
-            <a:r>
-              <a:rPr lang="nl-BE" dirty="0"/>
-              <a:t> cases (2)</a:t>
-            </a:r>
-          </a:p>
-        </p:txBody>
-      </p:sp>
-      <p:sp>
-        <p:nvSpPr>
-          <p:cNvPr id="3" name="Tijdelijke aanduiding voor dianummer 2"/>
-          <p:cNvSpPr>
-            <a:spLocks noGrp="1"/>
-          </p:cNvSpPr>
-          <p:nvPr>
-            <p:ph type="sldNum" sz="quarter" idx="12"/>
-          </p:nvPr>
-        </p:nvSpPr>
-        <p:spPr/>
-        <p:txBody>
-          <a:bodyPr/>
-          <a:lstStyle/>
-          <a:p>
-            <a:fld id="{F35D8031-C8E5-48F8-A3B6-81643B27A3AF}" type="slidenum">
-              <a:rPr lang="nl-BE" smtClean="0"/>
-              <a:pPr/>
-              <a:t>4</a:t>
-            </a:fld>
-            <a:endParaRPr lang="nl-BE" dirty="0"/>
-          </a:p>
-        </p:txBody>
-      </p:sp>
-      <p:sp>
-        <p:nvSpPr>
-          <p:cNvPr id="4" name="Tijdelijke aanduiding voor inhoud 3"/>
-          <p:cNvSpPr>
-            <a:spLocks noGrp="1"/>
-          </p:cNvSpPr>
-          <p:nvPr>
-            <p:ph idx="1"/>
-          </p:nvPr>
-        </p:nvSpPr>
-        <p:spPr/>
-        <p:txBody>
-          <a:bodyPr/>
-          <a:lstStyle/>
-          <a:p>
-            <a:r>
-              <a:rPr lang="en-GB" dirty="0"/>
-              <a:t>When you’re on the home page, you get the possibility to log in or to register. (you get these possibilities on the other pages to)</a:t>
-            </a:r>
-          </a:p>
-          <a:p>
-            <a:r>
-              <a:rPr lang="en-GB" dirty="0"/>
-              <a:t>When you log in the login bar will be replaced by a welcome message.</a:t>
-            </a:r>
-          </a:p>
-          <a:p>
-            <a:r>
-              <a:rPr lang="en-GB" dirty="0"/>
-              <a:t>When you click on sign up you will be redirected to a register page.</a:t>
-            </a:r>
-          </a:p>
-          <a:p>
-            <a:r>
-              <a:rPr lang="en-GB" dirty="0"/>
-              <a:t>On the home page there is a brief overview of the games you can play and how the site must be used</a:t>
-            </a:r>
-          </a:p>
-          <a:p>
-            <a:endParaRPr lang="en-GB" dirty="0"/>
-          </a:p>
-          <a:p>
-            <a:pPr marL="0" indent="0">
-              <a:buNone/>
-            </a:pPr>
-            <a:endParaRPr lang="en-GB" dirty="0"/>
-          </a:p>
-        </p:txBody>
-      </p:sp>
-    </p:spTree>
-    <p:extLst>
-      <p:ext uri="{BB962C8B-B14F-4D97-AF65-F5344CB8AC3E}">
-        <p14:creationId xmlns:p14="http://schemas.microsoft.com/office/powerpoint/2010/main" val="3770179075"/>
-      </p:ext>
-    </p:extLst>
-  </p:cSld>
-  <p:clrMapOvr>
-    <a:masterClrMapping/>
-  </p:clrMapOvr>
-</p:sld>
-</file>
-
-<file path=ppt/slides/slide5.xml><?xml version="1.0" encoding="utf-8"?>
-<p:sld xmlns:a="http://schemas.openxmlformats.org/drawingml/2006/main" xmlns:r="http://schemas.openxmlformats.org/officeDocument/2006/relationships" xmlns:p="http://schemas.openxmlformats.org/presentationml/2006/main">
-  <p:cSld>
-    <p:spTree>
-      <p:nvGrpSpPr>
-        <p:cNvPr id="1" name=""/>
-        <p:cNvGrpSpPr/>
-        <p:nvPr/>
-      </p:nvGrpSpPr>
-      <p:grpSpPr>
-        <a:xfrm>
-          <a:off x="0" y="0"/>
-          <a:ext cx="0" cy="0"/>
-          <a:chOff x="0" y="0"/>
-          <a:chExt cx="0" cy="0"/>
-        </a:xfrm>
-      </p:grpSpPr>
-      <p:sp>
-        <p:nvSpPr>
-          <p:cNvPr id="2" name="Titel 1"/>
-          <p:cNvSpPr>
-            <a:spLocks noGrp="1"/>
-          </p:cNvSpPr>
-          <p:nvPr>
-            <p:ph type="title"/>
-          </p:nvPr>
-        </p:nvSpPr>
-        <p:spPr/>
-        <p:txBody>
-          <a:bodyPr/>
-          <a:lstStyle/>
-          <a:p>
-            <a:r>
-              <a:rPr lang="en-GB" dirty="0"/>
-              <a:t>Use</a:t>
-            </a:r>
-            <a:r>
-              <a:rPr lang="nl-BE" dirty="0"/>
-              <a:t> case (3)</a:t>
-            </a:r>
-          </a:p>
-        </p:txBody>
-      </p:sp>
-      <p:sp>
-        <p:nvSpPr>
-          <p:cNvPr id="3" name="Tijdelijke aanduiding voor dianummer 2"/>
-          <p:cNvSpPr>
-            <a:spLocks noGrp="1"/>
-          </p:cNvSpPr>
-          <p:nvPr>
-            <p:ph type="sldNum" sz="quarter" idx="12"/>
-          </p:nvPr>
-        </p:nvSpPr>
-        <p:spPr/>
-        <p:txBody>
-          <a:bodyPr/>
-          <a:lstStyle/>
-          <a:p>
-            <a:fld id="{F35D8031-C8E5-48F8-A3B6-81643B27A3AF}" type="slidenum">
-              <a:rPr lang="nl-BE" smtClean="0"/>
-              <a:pPr/>
-              <a:t>5</a:t>
-            </a:fld>
-            <a:endParaRPr lang="nl-BE" dirty="0"/>
-          </a:p>
-        </p:txBody>
-      </p:sp>
-      <p:sp>
-        <p:nvSpPr>
-          <p:cNvPr id="4" name="Tijdelijke aanduiding voor inhoud 3"/>
-          <p:cNvSpPr>
-            <a:spLocks noGrp="1"/>
-          </p:cNvSpPr>
-          <p:nvPr>
-            <p:ph idx="1"/>
-          </p:nvPr>
-        </p:nvSpPr>
-        <p:spPr/>
-        <p:txBody>
-          <a:bodyPr/>
-          <a:lstStyle/>
-          <a:p>
-            <a:r>
-              <a:rPr lang="en-GB" dirty="0"/>
-              <a:t>When you go to the games page and you’re not logged in, you should get a message to login.</a:t>
-            </a:r>
-          </a:p>
-          <a:p>
-            <a:r>
-              <a:rPr lang="en-GB" dirty="0"/>
-              <a:t>When you’re logged in you get a brief overview of the different games.</a:t>
-            </a:r>
-          </a:p>
-          <a:p>
-            <a:r>
-              <a:rPr lang="en-GB" dirty="0"/>
-              <a:t>There should also be a demo page where you can try the games without being logged in.</a:t>
-            </a:r>
-          </a:p>
-          <a:p>
-            <a:r>
-              <a:rPr lang="en-GB" dirty="0"/>
-              <a:t>When logged in you’re able to chat with other players.</a:t>
-            </a:r>
-          </a:p>
-          <a:p>
-            <a:r>
-              <a:rPr lang="en-GB" dirty="0"/>
-              <a:t>When logged in you’ll see the amount of money available on your account.</a:t>
-            </a:r>
-          </a:p>
-        </p:txBody>
-      </p:sp>
-    </p:spTree>
-    <p:extLst>
-      <p:ext uri="{BB962C8B-B14F-4D97-AF65-F5344CB8AC3E}">
-        <p14:creationId xmlns:p14="http://schemas.microsoft.com/office/powerpoint/2010/main" val="2309519774"/>
-      </p:ext>
-    </p:extLst>
-  </p:cSld>
-  <p:clrMapOvr>
-    <a:masterClrMapping/>
-  </p:clrMapOvr>
-</p:sld>
-</file>
-
-<file path=ppt/slides/slide6.xml><?xml version="1.0" encoding="utf-8"?>
-<p:sld xmlns:a="http://schemas.openxmlformats.org/drawingml/2006/main" xmlns:r="http://schemas.openxmlformats.org/officeDocument/2006/relationships" xmlns:p="http://schemas.openxmlformats.org/presentationml/2006/main">
-  <p:cSld>
-    <p:spTree>
-      <p:nvGrpSpPr>
-        <p:cNvPr id="1" name=""/>
-        <p:cNvGrpSpPr/>
-        <p:nvPr/>
-      </p:nvGrpSpPr>
-      <p:grpSpPr>
-        <a:xfrm>
-          <a:off x="0" y="0"/>
-          <a:ext cx="0" cy="0"/>
-          <a:chOff x="0" y="0"/>
-          <a:chExt cx="0" cy="0"/>
-        </a:xfrm>
-      </p:grpSpPr>
-      <p:sp>
-        <p:nvSpPr>
-          <p:cNvPr id="2" name="Titel 1"/>
-          <p:cNvSpPr>
-            <a:spLocks noGrp="1"/>
-          </p:cNvSpPr>
-          <p:nvPr>
-            <p:ph type="title"/>
-          </p:nvPr>
-        </p:nvSpPr>
-        <p:spPr/>
-        <p:txBody>
-          <a:bodyPr/>
-          <a:lstStyle/>
-          <a:p>
-            <a:r>
-              <a:rPr lang="nl-BE" dirty="0" err="1"/>
-              <a:t>Use</a:t>
-            </a:r>
-            <a:r>
-              <a:rPr lang="nl-BE" dirty="0"/>
-              <a:t> case (4)</a:t>
-            </a:r>
-          </a:p>
-        </p:txBody>
-      </p:sp>
-      <p:sp>
-        <p:nvSpPr>
-          <p:cNvPr id="3" name="Tijdelijke aanduiding voor dianummer 2"/>
-          <p:cNvSpPr>
-            <a:spLocks noGrp="1"/>
-          </p:cNvSpPr>
-          <p:nvPr>
-            <p:ph type="sldNum" sz="quarter" idx="12"/>
-          </p:nvPr>
-        </p:nvSpPr>
-        <p:spPr/>
-        <p:txBody>
-          <a:bodyPr/>
-          <a:lstStyle/>
-          <a:p>
-            <a:fld id="{F35D8031-C8E5-48F8-A3B6-81643B27A3AF}" type="slidenum">
-              <a:rPr lang="nl-BE" smtClean="0"/>
-              <a:pPr/>
-              <a:t>6</a:t>
-            </a:fld>
-            <a:endParaRPr lang="nl-BE" dirty="0"/>
-          </a:p>
-        </p:txBody>
-      </p:sp>
-      <p:sp>
-        <p:nvSpPr>
-          <p:cNvPr id="4" name="Tijdelijke aanduiding voor inhoud 3"/>
-          <p:cNvSpPr>
-            <a:spLocks noGrp="1"/>
-          </p:cNvSpPr>
-          <p:nvPr>
-            <p:ph idx="1"/>
-          </p:nvPr>
-        </p:nvSpPr>
-        <p:spPr/>
-        <p:txBody>
-          <a:bodyPr/>
-          <a:lstStyle/>
-          <a:p>
-            <a:r>
-              <a:rPr lang="en-GB" dirty="0"/>
-              <a:t>On the account page you get an overview of your account info and the possibility to change them.</a:t>
-            </a:r>
-          </a:p>
-          <a:p>
-            <a:r>
-              <a:rPr lang="en-GB" dirty="0"/>
-              <a:t>You get the possibility to charge some money on the account.</a:t>
-            </a:r>
-          </a:p>
-          <a:p>
-            <a:r>
-              <a:rPr lang="en-GB" dirty="0"/>
-              <a:t>You get an overview of the money you spend and the profit you made.</a:t>
-            </a:r>
-          </a:p>
-          <a:p>
-            <a:r>
-              <a:rPr lang="en-GB" dirty="0"/>
-              <a:t>You get the possibility to put your profit back on your bank account.</a:t>
-            </a:r>
-          </a:p>
-          <a:p>
-            <a:endParaRPr lang="en-GB" dirty="0"/>
-          </a:p>
-        </p:txBody>
-      </p:sp>
-    </p:spTree>
-    <p:extLst>
-      <p:ext uri="{BB962C8B-B14F-4D97-AF65-F5344CB8AC3E}">
-        <p14:creationId xmlns:p14="http://schemas.microsoft.com/office/powerpoint/2010/main" val="590584970"/>
-      </p:ext>
-    </p:extLst>
-  </p:cSld>
-  <p:clrMapOvr>
-    <a:masterClrMapping/>
-  </p:clrMapOvr>
-</p:sld>
-</file>
-
-<file path=ppt/slides/slide7.xml><?xml version="1.0" encoding="utf-8"?>
-<p:sld xmlns:a="http://schemas.openxmlformats.org/drawingml/2006/main" xmlns:r="http://schemas.openxmlformats.org/officeDocument/2006/relationships" xmlns:p="http://schemas.openxmlformats.org/presentationml/2006/main">
-  <p:cSld>
-    <p:spTree>
-      <p:nvGrpSpPr>
-        <p:cNvPr id="1" name=""/>
-        <p:cNvGrpSpPr/>
-        <p:nvPr/>
-      </p:nvGrpSpPr>
-      <p:grpSpPr>
-        <a:xfrm>
-          <a:off x="0" y="0"/>
-          <a:ext cx="0" cy="0"/>
-          <a:chOff x="0" y="0"/>
-          <a:chExt cx="0" cy="0"/>
-        </a:xfrm>
-      </p:grpSpPr>
-      <p:sp>
-        <p:nvSpPr>
-          <p:cNvPr id="2" name="Titel 1"/>
-          <p:cNvSpPr>
-            <a:spLocks noGrp="1"/>
-          </p:cNvSpPr>
-          <p:nvPr>
-            <p:ph type="title"/>
-          </p:nvPr>
-        </p:nvSpPr>
-        <p:spPr/>
-        <p:txBody>
-          <a:bodyPr/>
-          <a:lstStyle/>
-          <a:p>
-            <a:r>
-              <a:rPr lang="nl-BE" dirty="0" err="1"/>
-              <a:t>Use</a:t>
-            </a:r>
-            <a:r>
-              <a:rPr lang="nl-BE" dirty="0"/>
-              <a:t> case (5)</a:t>
-            </a:r>
-          </a:p>
-        </p:txBody>
-      </p:sp>
-      <p:sp>
-        <p:nvSpPr>
-          <p:cNvPr id="3" name="Tijdelijke aanduiding voor dianummer 2"/>
-          <p:cNvSpPr>
-            <a:spLocks noGrp="1"/>
-          </p:cNvSpPr>
-          <p:nvPr>
-            <p:ph type="sldNum" sz="quarter" idx="12"/>
-          </p:nvPr>
-        </p:nvSpPr>
-        <p:spPr/>
-        <p:txBody>
-          <a:bodyPr/>
-          <a:lstStyle/>
-          <a:p>
-            <a:fld id="{F35D8031-C8E5-48F8-A3B6-81643B27A3AF}" type="slidenum">
-              <a:rPr lang="nl-BE" smtClean="0"/>
-              <a:pPr/>
-              <a:t>7</a:t>
-            </a:fld>
-            <a:endParaRPr lang="nl-BE" dirty="0"/>
-          </a:p>
-        </p:txBody>
-      </p:sp>
-      <p:sp>
-        <p:nvSpPr>
-          <p:cNvPr id="4" name="Tijdelijke aanduiding voor inhoud 3"/>
-          <p:cNvSpPr>
-            <a:spLocks noGrp="1"/>
-          </p:cNvSpPr>
-          <p:nvPr>
-            <p:ph idx="1"/>
-          </p:nvPr>
-        </p:nvSpPr>
-        <p:spPr/>
-        <p:txBody>
-          <a:bodyPr/>
-          <a:lstStyle/>
-          <a:p>
-            <a:r>
-              <a:rPr lang="en-GB" dirty="0"/>
-              <a:t>On the info page you’ll find the information about how you charge money on your account.</a:t>
-            </a:r>
-          </a:p>
-          <a:p>
-            <a:r>
-              <a:rPr lang="en-GB" dirty="0"/>
-              <a:t>You’ll find the rules of every game.</a:t>
-            </a:r>
-          </a:p>
-        </p:txBody>
-      </p:sp>
-    </p:spTree>
-    <p:extLst>
-      <p:ext uri="{BB962C8B-B14F-4D97-AF65-F5344CB8AC3E}">
-        <p14:creationId xmlns:p14="http://schemas.microsoft.com/office/powerpoint/2010/main" val="3399869822"/>
-      </p:ext>
-    </p:extLst>
-  </p:cSld>
-  <p:clrMapOvr>
-    <a:masterClrMapping/>
-  </p:clrMapOvr>
-</p:sld>
-</file>
-
-<file path=ppt/slides/slide8.xml><?xml version="1.0" encoding="utf-8"?>
-<p:sld xmlns:a="http://schemas.openxmlformats.org/drawingml/2006/main" xmlns:r="http://schemas.openxmlformats.org/officeDocument/2006/relationships" xmlns:p="http://schemas.openxmlformats.org/presentationml/2006/main">
-  <p:cSld>
-    <p:spTree>
-      <p:nvGrpSpPr>
-        <p:cNvPr id="1" name=""/>
-        <p:cNvGrpSpPr/>
-        <p:nvPr/>
-      </p:nvGrpSpPr>
-      <p:grpSpPr>
-        <a:xfrm>
-          <a:off x="0" y="0"/>
-          <a:ext cx="0" cy="0"/>
-          <a:chOff x="0" y="0"/>
-          <a:chExt cx="0" cy="0"/>
-        </a:xfrm>
-      </p:grpSpPr>
-      <p:sp>
-        <p:nvSpPr>
-          <p:cNvPr id="2" name="Titel 1"/>
-          <p:cNvSpPr>
-            <a:spLocks noGrp="1"/>
-          </p:cNvSpPr>
-          <p:nvPr>
-            <p:ph type="title"/>
-          </p:nvPr>
-        </p:nvSpPr>
-        <p:spPr/>
-        <p:txBody>
-          <a:bodyPr/>
-          <a:lstStyle/>
-          <a:p>
-            <a:r>
-              <a:rPr lang="nl-BE" dirty="0"/>
-              <a:t>Demo</a:t>
-            </a:r>
-          </a:p>
-        </p:txBody>
-      </p:sp>
-      <p:sp>
-        <p:nvSpPr>
-          <p:cNvPr id="3" name="Tijdelijke aanduiding voor dianummer 2"/>
-          <p:cNvSpPr>
-            <a:spLocks noGrp="1"/>
-          </p:cNvSpPr>
-          <p:nvPr>
-            <p:ph type="sldNum" sz="quarter" idx="12"/>
-          </p:nvPr>
-        </p:nvSpPr>
-        <p:spPr/>
-        <p:txBody>
-          <a:bodyPr/>
-          <a:lstStyle/>
-          <a:p>
-            <a:fld id="{F35D8031-C8E5-48F8-A3B6-81643B27A3AF}" type="slidenum">
-              <a:rPr lang="nl-BE" smtClean="0"/>
-              <a:pPr/>
-              <a:t>8</a:t>
-            </a:fld>
-            <a:endParaRPr lang="nl-BE" dirty="0"/>
-          </a:p>
-        </p:txBody>
-      </p:sp>
-      <p:sp>
-        <p:nvSpPr>
-          <p:cNvPr id="4" name="Tijdelijke aanduiding voor inhoud 3"/>
-          <p:cNvSpPr>
-            <a:spLocks noGrp="1"/>
-          </p:cNvSpPr>
-          <p:nvPr>
-            <p:ph idx="1"/>
-          </p:nvPr>
-        </p:nvSpPr>
-        <p:spPr/>
-        <p:txBody>
-          <a:bodyPr/>
-          <a:lstStyle/>
-          <a:p>
-            <a:endParaRPr lang="nl-BE"/>
-          </a:p>
-        </p:txBody>
-      </p:sp>
-    </p:spTree>
-    <p:extLst>
-      <p:ext uri="{BB962C8B-B14F-4D97-AF65-F5344CB8AC3E}">
-        <p14:creationId xmlns:p14="http://schemas.microsoft.com/office/powerpoint/2010/main" val="2385431591"/>
-      </p:ext>
-    </p:extLst>
-  </p:cSld>
-  <p:clrMapOvr>
-    <a:masterClrMapping/>
-  </p:clrMapOvr>
-</p:sld>
-</file>
-
-<file path=ppt/slides/slide9.xml><?xml version="1.0" encoding="utf-8"?>
-<p:sld xmlns:a="http://schemas.openxmlformats.org/drawingml/2006/main" xmlns:r="http://schemas.openxmlformats.org/officeDocument/2006/relationships" xmlns:p="http://schemas.openxmlformats.org/presentationml/2006/main">
-  <p:cSld>
-    <p:spTree>
-      <p:nvGrpSpPr>
-        <p:cNvPr id="1" name=""/>
-        <p:cNvGrpSpPr/>
-        <p:nvPr/>
-      </p:nvGrpSpPr>
-      <p:grpSpPr>
-        <a:xfrm>
-          <a:off x="0" y="0"/>
-          <a:ext cx="0" cy="0"/>
-          <a:chOff x="0" y="0"/>
-          <a:chExt cx="0" cy="0"/>
-        </a:xfrm>
-      </p:grpSpPr>
-      <p:sp>
-        <p:nvSpPr>
-          <p:cNvPr id="2" name="Titel 1"/>
-          <p:cNvSpPr>
-            <a:spLocks noGrp="1"/>
-          </p:cNvSpPr>
-          <p:nvPr>
-            <p:ph type="title"/>
-          </p:nvPr>
-        </p:nvSpPr>
-        <p:spPr/>
-        <p:txBody>
-          <a:bodyPr/>
-          <a:lstStyle/>
-          <a:p>
-            <a:r>
-              <a:rPr lang="nl-BE" dirty="0" err="1"/>
-              <a:t>Questions</a:t>
-            </a:r>
-            <a:r>
-              <a:rPr lang="nl-BE" dirty="0"/>
-              <a:t>?</a:t>
-            </a:r>
-          </a:p>
-        </p:txBody>
-      </p:sp>
-      <p:sp>
-        <p:nvSpPr>
-          <p:cNvPr id="3" name="Tijdelijke aanduiding voor dianummer 2"/>
-          <p:cNvSpPr>
-            <a:spLocks noGrp="1"/>
-          </p:cNvSpPr>
-          <p:nvPr>
-            <p:ph type="sldNum" sz="quarter" idx="12"/>
-          </p:nvPr>
-        </p:nvSpPr>
-        <p:spPr/>
-        <p:txBody>
-          <a:bodyPr/>
-          <a:lstStyle/>
-          <a:p>
-            <a:fld id="{F35D8031-C8E5-48F8-A3B6-81643B27A3AF}" type="slidenum">
-              <a:rPr lang="nl-BE" smtClean="0"/>
-              <a:pPr/>
-              <a:t>9</a:t>
-            </a:fld>
-            <a:endParaRPr lang="nl-BE" dirty="0"/>
-          </a:p>
-        </p:txBody>
-      </p:sp>
-      <p:sp>
-        <p:nvSpPr>
-          <p:cNvPr id="4" name="Tijdelijke aanduiding voor inhoud 3"/>
-          <p:cNvSpPr>
-            <a:spLocks noGrp="1"/>
-          </p:cNvSpPr>
-          <p:nvPr>
-            <p:ph idx="1"/>
-          </p:nvPr>
-        </p:nvSpPr>
-        <p:spPr/>
-        <p:txBody>
-          <a:bodyPr/>
-          <a:lstStyle/>
-          <a:p>
-            <a:endParaRPr lang="nl-BE"/>
-          </a:p>
-        </p:txBody>
-      </p:sp>
-    </p:spTree>
-    <p:extLst>
-      <p:ext uri="{BB962C8B-B14F-4D97-AF65-F5344CB8AC3E}">
-        <p14:creationId xmlns:p14="http://schemas.microsoft.com/office/powerpoint/2010/main" val="2755015403"/>
+        <p14:creationId xmlns:p14="http://schemas.microsoft.com/office/powerpoint/2010/main" val="862380136"/>
       </p:ext>
     </p:extLst>
   </p:cSld>

</xml_diff>